<commit_message>
Feat : CSV upload feature
</commit_message>
<xml_diff>
--- a/BluePPT.pptx
+++ b/BluePPT.pptx
@@ -317,11 +317,11 @@
         </c:dLbls>
         <c:marker val="1"/>
         <c:smooth val="0"/>
-        <c:axId val="38028800"/>
-        <c:axId val="53424640"/>
+        <c:axId val="156208128"/>
+        <c:axId val="151318464"/>
       </c:lineChart>
       <c:catAx>
-        <c:axId val="38028800"/>
+        <c:axId val="156208128"/>
         <c:scaling>
           <c:orientation val="minMax"/>
         </c:scaling>
@@ -330,7 +330,7 @@
         <c:majorTickMark val="out"/>
         <c:minorTickMark val="none"/>
         <c:tickLblPos val="nextTo"/>
-        <c:crossAx val="53424640"/>
+        <c:crossAx val="151318464"/>
         <c:crosses val="autoZero"/>
         <c:auto val="1"/>
         <c:lblAlgn val="ctr"/>
@@ -338,7 +338,7 @@
         <c:noMultiLvlLbl val="0"/>
       </c:catAx>
       <c:valAx>
-        <c:axId val="53424640"/>
+        <c:axId val="151318464"/>
         <c:scaling>
           <c:orientation val="minMax"/>
         </c:scaling>
@@ -349,7 +349,7 @@
         <c:majorTickMark val="out"/>
         <c:minorTickMark val="none"/>
         <c:tickLblPos val="nextTo"/>
-        <c:crossAx val="38028800"/>
+        <c:crossAx val="156208128"/>
         <c:crosses val="autoZero"/>
         <c:crossBetween val="between"/>
       </c:valAx>
@@ -650,11 +650,11 @@
         </c:dLbls>
         <c:marker val="1"/>
         <c:smooth val="0"/>
-        <c:axId val="38346240"/>
-        <c:axId val="90196224"/>
+        <c:axId val="159176192"/>
+        <c:axId val="151317888"/>
       </c:lineChart>
       <c:catAx>
-        <c:axId val="38346240"/>
+        <c:axId val="159176192"/>
         <c:scaling>
           <c:orientation val="minMax"/>
         </c:scaling>
@@ -663,7 +663,7 @@
         <c:majorTickMark val="out"/>
         <c:minorTickMark val="none"/>
         <c:tickLblPos val="nextTo"/>
-        <c:crossAx val="90196224"/>
+        <c:crossAx val="151317888"/>
         <c:crosses val="autoZero"/>
         <c:auto val="1"/>
         <c:lblAlgn val="ctr"/>
@@ -671,7 +671,7 @@
         <c:noMultiLvlLbl val="0"/>
       </c:catAx>
       <c:valAx>
-        <c:axId val="90196224"/>
+        <c:axId val="151317888"/>
         <c:scaling>
           <c:orientation val="minMax"/>
         </c:scaling>
@@ -682,7 +682,7 @@
         <c:majorTickMark val="out"/>
         <c:minorTickMark val="none"/>
         <c:tickLblPos val="nextTo"/>
-        <c:crossAx val="38346240"/>
+        <c:crossAx val="159176192"/>
         <c:crosses val="autoZero"/>
         <c:crossBetween val="between"/>
       </c:valAx>
@@ -810,7 +810,6 @@
     </c:plotArea>
     <c:legend>
       <c:legendPos val="r"/>
-      <c:layout/>
       <c:overlay val="0"/>
     </c:legend>
     <c:plotVisOnly val="1"/>
@@ -983,11 +982,11 @@
         </c:dLbls>
         <c:marker val="1"/>
         <c:smooth val="0"/>
-        <c:axId val="39216640"/>
-        <c:axId val="90198528"/>
+        <c:axId val="156077568"/>
+        <c:axId val="102329152"/>
       </c:lineChart>
       <c:catAx>
-        <c:axId val="39216640"/>
+        <c:axId val="156077568"/>
         <c:scaling>
           <c:orientation val="minMax"/>
         </c:scaling>
@@ -996,7 +995,7 @@
         <c:majorTickMark val="out"/>
         <c:minorTickMark val="none"/>
         <c:tickLblPos val="nextTo"/>
-        <c:crossAx val="90198528"/>
+        <c:crossAx val="102329152"/>
         <c:crosses val="autoZero"/>
         <c:auto val="1"/>
         <c:lblAlgn val="ctr"/>
@@ -1004,7 +1003,7 @@
         <c:noMultiLvlLbl val="0"/>
       </c:catAx>
       <c:valAx>
-        <c:axId val="90198528"/>
+        <c:axId val="102329152"/>
         <c:scaling>
           <c:orientation val="minMax"/>
         </c:scaling>
@@ -1015,7 +1014,7 @@
         <c:majorTickMark val="out"/>
         <c:minorTickMark val="none"/>
         <c:tickLblPos val="nextTo"/>
-        <c:crossAx val="39216640"/>
+        <c:crossAx val="156077568"/>
         <c:crosses val="autoZero"/>
         <c:crossBetween val="between"/>
       </c:valAx>
@@ -1143,7 +1142,6 @@
     </c:plotArea>
     <c:legend>
       <c:legendPos val="r"/>
-      <c:layout/>
       <c:overlay val="0"/>
     </c:legend>
     <c:plotVisOnly val="1"/>
@@ -22347,7 +22345,7 @@
           <p:nvPr>
             <p:extLst>
               <p:ext uri="{D42A27DB-BD31-4B8C-83A1-F6EECF244321}">
-                <p14:modId xmlns:p14="http://schemas.microsoft.com/office/powerpoint/2010/main" val="3676802208"/>
+                <p14:modId xmlns:p14="http://schemas.microsoft.com/office/powerpoint/2010/main" val="1997807307"/>
               </p:ext>
             </p:extLst>
           </p:nvPr>
@@ -22363,12 +22361,12 @@
                 <a:tableStyleId>{21E4AEA4-8DFA-4A89-87EB-49C32662AFE0}</a:tableStyleId>
               </a:tblPr>
               <a:tblGrid>
-                <a:gridCol w="1516089"/>
-                <a:gridCol w="1516089"/>
-                <a:gridCol w="1516970"/>
-                <a:gridCol w="1637256"/>
-                <a:gridCol w="1478797"/>
-                <a:gridCol w="1478797"/>
+                <a:gridCol w="1259632"/>
+                <a:gridCol w="1368152"/>
+                <a:gridCol w="1584176"/>
+                <a:gridCol w="1872208"/>
+                <a:gridCol w="1512168"/>
+                <a:gridCol w="1547662"/>
               </a:tblGrid>
               <a:tr h="873851">
                 <a:tc>
@@ -22588,7 +22586,7 @@
                       <a:pPr algn="ctr"/>
                       <a:r>
                         <a:rPr lang="en-US" altLang="ko-KR" dirty="0" smtClean="0"/>
-                        <a:t>supply</a:t>
+                        <a:t>Supply</a:t>
                       </a:r>
                       <a:endParaRPr lang="ko-KR" altLang="en-US" dirty="0"/>
                     </a:p>
@@ -22679,15 +22677,15 @@
                             <a:srgbClr val="0070C0"/>
                           </a:solidFill>
                         </a:rPr>
-                        <a:t>(S)</a:t>
-                      </a:r>
-                      <a:r>
-                        <a:rPr lang="en-US" altLang="ko-KR" b="1" dirty="0" err="1" smtClean="0">
+                        <a:t>(</a:t>
+                      </a:r>
+                      <a:r>
+                        <a:rPr lang="en-US" altLang="ko-KR" b="1" dirty="0" smtClean="0">
                           <a:solidFill>
                             <a:srgbClr val="0070C0"/>
                           </a:solidFill>
                         </a:rPr>
-                        <a:t>pCode</a:t>
+                        <a:t>S)pCode_4</a:t>
                       </a:r>
                       <a:endParaRPr lang="en-US" altLang="ko-KR" b="1" dirty="0" smtClean="0">
                         <a:solidFill>
@@ -22754,11 +22752,11 @@
                       <a:pPr algn="l" latinLnBrk="1"/>
                       <a:r>
                         <a:rPr lang="en-US" altLang="ko-KR" b="1" dirty="0" smtClean="0"/>
-                        <a:t>(S)</a:t>
+                        <a:t>(I)</a:t>
                       </a:r>
                       <a:r>
                         <a:rPr lang="en-US" altLang="ko-KR" b="1" dirty="0" err="1" smtClean="0"/>
-                        <a:t>oCode</a:t>
+                        <a:t>oNum</a:t>
                       </a:r>
                       <a:endParaRPr lang="en-US" altLang="ko-KR" dirty="0" smtClean="0">
                         <a:solidFill>
@@ -22810,7 +22808,15 @@
                             <a:srgbClr val="00B050"/>
                           </a:solidFill>
                         </a:rPr>
-                        <a:t>(S)</a:t>
+                        <a:t>(</a:t>
+                      </a:r>
+                      <a:r>
+                        <a:rPr lang="en-US" altLang="ko-KR" dirty="0" smtClean="0">
+                          <a:solidFill>
+                            <a:srgbClr val="00B050"/>
+                          </a:solidFill>
+                        </a:rPr>
+                        <a:t>S)</a:t>
                       </a:r>
                       <a:r>
                         <a:rPr lang="en-US" altLang="ko-KR" dirty="0" err="1" smtClean="0">
@@ -22840,15 +22846,15 @@
                             <a:srgbClr val="00B050"/>
                           </a:solidFill>
                         </a:rPr>
-                        <a:t>(S)</a:t>
-                      </a:r>
-                      <a:r>
-                        <a:rPr lang="en-US" altLang="ko-KR" b="1" dirty="0" err="1" smtClean="0">
+                        <a:t>(</a:t>
+                      </a:r>
+                      <a:r>
+                        <a:rPr lang="en-US" altLang="ko-KR" b="1" dirty="0" smtClean="0">
                           <a:solidFill>
                             <a:srgbClr val="00B050"/>
                           </a:solidFill>
                         </a:rPr>
-                        <a:t>iCode</a:t>
+                        <a:t>S)iCode_13</a:t>
                       </a:r>
                       <a:endParaRPr lang="en-US" altLang="ko-KR" b="1" dirty="0" smtClean="0">
                         <a:solidFill>
@@ -23040,15 +23046,15 @@
                             <a:schemeClr val="tx1"/>
                           </a:solidFill>
                         </a:rPr>
-                        <a:t>(S)</a:t>
-                      </a:r>
-                      <a:r>
-                        <a:rPr lang="en-US" altLang="ko-KR" b="1" dirty="0" err="1" smtClean="0">
+                        <a:t>(</a:t>
+                      </a:r>
+                      <a:r>
+                        <a:rPr lang="en-US" altLang="ko-KR" b="1" dirty="0" smtClean="0">
                           <a:solidFill>
                             <a:schemeClr val="tx1"/>
                           </a:solidFill>
                         </a:rPr>
-                        <a:t>sCode</a:t>
+                        <a:t>S)sCode_10</a:t>
                       </a:r>
                       <a:endParaRPr lang="en-US" altLang="ko-KR" b="1" dirty="0" smtClean="0">
                         <a:solidFill>
@@ -23285,9 +23291,28 @@
                       <a:pPr algn="ctr" latinLnBrk="1"/>
                       <a:r>
                         <a:rPr lang="ko-KR" altLang="en-US" baseline="0" dirty="0" smtClean="0"/>
-                        <a:t>제품코드</a:t>
-                      </a:r>
-                      <a:endParaRPr lang="en-US" altLang="ko-KR" dirty="0" smtClean="0"/>
+                        <a:t>공급처구분</a:t>
+                      </a:r>
+                      <a:r>
+                        <a:rPr lang="en-US" altLang="ko-KR" baseline="0" dirty="0" smtClean="0"/>
+                        <a:t>+</a:t>
+                      </a:r>
+                    </a:p>
+                    <a:p>
+                      <a:pPr algn="ctr" latinLnBrk="1"/>
+                      <a:r>
+                        <a:rPr lang="ko-KR" altLang="en-US" baseline="0" dirty="0" smtClean="0"/>
+                        <a:t>자동 </a:t>
+                      </a:r>
+                      <a:r>
+                        <a:rPr lang="en-US" altLang="ko-KR" baseline="0" dirty="0" smtClean="0"/>
+                        <a:t>3</a:t>
+                      </a:r>
+                      <a:r>
+                        <a:rPr lang="ko-KR" altLang="en-US" baseline="0" dirty="0" smtClean="0"/>
+                        <a:t>자리</a:t>
+                      </a:r>
+                      <a:endParaRPr lang="en-US" altLang="ko-KR" baseline="0" dirty="0" smtClean="0"/>
                     </a:p>
                   </a:txBody>
                   <a:tcPr anchor="ctr"/>
@@ -23300,18 +23325,26 @@
                       <a:pPr algn="ctr" latinLnBrk="1"/>
                       <a:r>
                         <a:rPr lang="en-US" altLang="ko-KR" dirty="0" err="1" smtClean="0"/>
-                        <a:t>oCode</a:t>
-                      </a:r>
-                      <a:r>
-                        <a:rPr lang="en-US" altLang="ko-KR" dirty="0" smtClean="0"/>
-                        <a:t> =</a:t>
+                        <a:t>oNum</a:t>
+                      </a:r>
+                      <a:r>
+                        <a:rPr lang="en-US" altLang="ko-KR" baseline="0" dirty="0" smtClean="0"/>
+                        <a:t> = </a:t>
                       </a:r>
                     </a:p>
                     <a:p>
                       <a:pPr algn="ctr" latinLnBrk="1"/>
                       <a:r>
-                        <a:rPr lang="ko-KR" altLang="en-US" dirty="0" smtClean="0"/>
-                        <a:t>주문번호</a:t>
+                        <a:rPr lang="ko-KR" altLang="en-US" baseline="0" dirty="0" smtClean="0"/>
+                        <a:t>자동 </a:t>
+                      </a:r>
+                      <a:r>
+                        <a:rPr lang="en-US" altLang="ko-KR" baseline="0" dirty="0" smtClean="0"/>
+                        <a:t>4</a:t>
+                      </a:r>
+                      <a:r>
+                        <a:rPr lang="ko-KR" altLang="en-US" baseline="0" dirty="0" smtClean="0"/>
+                        <a:t>자리</a:t>
                       </a:r>
                       <a:endParaRPr lang="ko-KR" altLang="en-US" dirty="0"/>
                     </a:p>
@@ -23332,14 +23365,68 @@
                         <a:rPr lang="en-US" altLang="ko-KR" dirty="0" smtClean="0"/>
                         <a:t> = </a:t>
                       </a:r>
+                      <a:endParaRPr lang="en-US" altLang="ko-KR" dirty="0" smtClean="0"/>
                     </a:p>
                     <a:p>
                       <a:pPr algn="ctr"/>
                       <a:r>
                         <a:rPr lang="ko-KR" altLang="en-US" dirty="0" smtClean="0"/>
-                        <a:t>송장번호</a:t>
-                      </a:r>
-                      <a:endParaRPr lang="ko-KR" altLang="en-US" dirty="0"/>
+                        <a:t>쇼핑몰구분</a:t>
+                      </a:r>
+                      <a:r>
+                        <a:rPr lang="en-US" altLang="ko-KR" dirty="0" smtClean="0"/>
+                        <a:t>+</a:t>
+                      </a:r>
+                    </a:p>
+                    <a:p>
+                      <a:pPr algn="ctr"/>
+                      <a:r>
+                        <a:rPr lang="ko-KR" altLang="en-US" dirty="0" err="1" smtClean="0"/>
+                        <a:t>운송사구분</a:t>
+                      </a:r>
+                      <a:r>
+                        <a:rPr lang="en-US" altLang="ko-KR" dirty="0" smtClean="0"/>
+                        <a:t>+</a:t>
+                      </a:r>
+                    </a:p>
+                    <a:p>
+                      <a:pPr algn="ctr"/>
+                      <a:r>
+                        <a:rPr lang="ko-KR" altLang="en-US" dirty="0" smtClean="0"/>
+                        <a:t>날짜</a:t>
+                      </a:r>
+                      <a:r>
+                        <a:rPr lang="en-US" altLang="ko-KR" dirty="0" smtClean="0"/>
+                        <a:t>(6</a:t>
+                      </a:r>
+                      <a:r>
+                        <a:rPr lang="ko-KR" altLang="en-US" dirty="0" smtClean="0"/>
+                        <a:t>자리</a:t>
+                      </a:r>
+                      <a:r>
+                        <a:rPr lang="en-US" altLang="ko-KR" dirty="0" smtClean="0"/>
+                        <a:t>)+</a:t>
+                      </a:r>
+                    </a:p>
+                    <a:p>
+                      <a:pPr algn="ctr"/>
+                      <a:r>
+                        <a:rPr lang="ko-KR" altLang="en-US" dirty="0" smtClean="0"/>
+                        <a:t>자동</a:t>
+                      </a:r>
+                      <a:r>
+                        <a:rPr lang="en-US" altLang="ko-KR" dirty="0" smtClean="0"/>
+                        <a:t>(5</a:t>
+                      </a:r>
+                      <a:r>
+                        <a:rPr lang="ko-KR" altLang="en-US" dirty="0" smtClean="0"/>
+                        <a:t>자리</a:t>
+                      </a:r>
+                      <a:r>
+                        <a:rPr lang="en-US" altLang="ko-KR" dirty="0" smtClean="0"/>
+                        <a:t>)</a:t>
+                      </a:r>
+                      <a:endParaRPr lang="en-US" altLang="ko-KR" dirty="0" smtClean="0"/>
                     </a:p>
                   </a:txBody>
                   <a:tcPr anchor="ctr"/>
@@ -23363,7 +23450,49 @@
                       <a:pPr algn="ctr" latinLnBrk="1"/>
                       <a:r>
                         <a:rPr lang="ko-KR" altLang="en-US" dirty="0" smtClean="0"/>
-                        <a:t>발주코드</a:t>
+                        <a:t>공급처구분</a:t>
+                      </a:r>
+                      <a:r>
+                        <a:rPr lang="en-US" altLang="ko-KR" dirty="0" smtClean="0"/>
+                        <a:t>+</a:t>
+                      </a:r>
+                    </a:p>
+                    <a:p>
+                      <a:pPr algn="ctr" latinLnBrk="1"/>
+                      <a:r>
+                        <a:rPr lang="ko-KR" altLang="en-US" dirty="0" smtClean="0"/>
+                        <a:t>날짜</a:t>
+                      </a:r>
+                      <a:r>
+                        <a:rPr lang="en-US" altLang="ko-KR" dirty="0" smtClean="0"/>
+                        <a:t>(6</a:t>
+                      </a:r>
+                      <a:r>
+                        <a:rPr lang="ko-KR" altLang="en-US" dirty="0" smtClean="0"/>
+                        <a:t>자리</a:t>
+                      </a:r>
+                      <a:r>
+                        <a:rPr lang="en-US" altLang="ko-KR" dirty="0" smtClean="0"/>
+                        <a:t>)+</a:t>
+                      </a:r>
+                    </a:p>
+                    <a:p>
+                      <a:pPr algn="ctr" latinLnBrk="1"/>
+                      <a:r>
+                        <a:rPr lang="ko-KR" altLang="en-US" dirty="0" smtClean="0"/>
+                        <a:t>자동</a:t>
+                      </a:r>
+                      <a:r>
+                        <a:rPr lang="en-US" altLang="ko-KR" dirty="0" smtClean="0"/>
+                        <a:t>(3</a:t>
+                      </a:r>
+                      <a:r>
+                        <a:rPr lang="ko-KR" altLang="en-US" dirty="0" smtClean="0"/>
+                        <a:t>자리</a:t>
+                      </a:r>
+                      <a:r>
+                        <a:rPr lang="en-US" altLang="ko-KR" dirty="0" smtClean="0"/>
+                        <a:t>)</a:t>
                       </a:r>
                       <a:endParaRPr lang="en-US" altLang="ko-KR" dirty="0" smtClean="0"/>
                     </a:p>
@@ -23695,7 +23824,23 @@
                   <a:schemeClr val="tx1"/>
                 </a:solidFill>
               </a:rPr>
-              <a:t>구매처</a:t>
+              <a:t>공</a:t>
+            </a:r>
+            <a:r>
+              <a:rPr lang="ko-KR" altLang="en-US" dirty="0">
+                <a:solidFill>
+                  <a:schemeClr val="tx1"/>
+                </a:solidFill>
+              </a:rPr>
+              <a:t>급</a:t>
+            </a:r>
+            <a:r>
+              <a:rPr lang="ko-KR" altLang="en-US" dirty="0" smtClean="0">
+                <a:solidFill>
+                  <a:schemeClr val="tx1"/>
+                </a:solidFill>
+              </a:rPr>
+              <a:t>처</a:t>
             </a:r>
             <a:endParaRPr lang="ko-KR" altLang="en-US" dirty="0">
               <a:solidFill>

</xml_diff>

<commit_message>
Feat : add forwarding feature
</commit_message>
<xml_diff>
--- a/BluePPT.pptx
+++ b/BluePPT.pptx
@@ -317,11 +317,11 @@
         </c:dLbls>
         <c:marker val="1"/>
         <c:smooth val="0"/>
-        <c:axId val="40425984"/>
-        <c:axId val="117188864"/>
+        <c:axId val="34799104"/>
+        <c:axId val="33577728"/>
       </c:lineChart>
       <c:catAx>
-        <c:axId val="40425984"/>
+        <c:axId val="34799104"/>
         <c:scaling>
           <c:orientation val="minMax"/>
         </c:scaling>
@@ -330,7 +330,7 @@
         <c:majorTickMark val="out"/>
         <c:minorTickMark val="none"/>
         <c:tickLblPos val="nextTo"/>
-        <c:crossAx val="117188864"/>
+        <c:crossAx val="33577728"/>
         <c:crosses val="autoZero"/>
         <c:auto val="1"/>
         <c:lblAlgn val="ctr"/>
@@ -338,7 +338,7 @@
         <c:noMultiLvlLbl val="0"/>
       </c:catAx>
       <c:valAx>
-        <c:axId val="117188864"/>
+        <c:axId val="33577728"/>
         <c:scaling>
           <c:orientation val="minMax"/>
         </c:scaling>
@@ -349,7 +349,7 @@
         <c:majorTickMark val="out"/>
         <c:minorTickMark val="none"/>
         <c:tickLblPos val="nextTo"/>
-        <c:crossAx val="40425984"/>
+        <c:crossAx val="34799104"/>
         <c:crosses val="autoZero"/>
         <c:crossBetween val="between"/>
       </c:valAx>
@@ -650,11 +650,11 @@
         </c:dLbls>
         <c:marker val="1"/>
         <c:smooth val="0"/>
-        <c:axId val="52425728"/>
-        <c:axId val="90851584"/>
+        <c:axId val="130592256"/>
+        <c:axId val="33596544"/>
       </c:lineChart>
       <c:catAx>
-        <c:axId val="52425728"/>
+        <c:axId val="130592256"/>
         <c:scaling>
           <c:orientation val="minMax"/>
         </c:scaling>
@@ -663,7 +663,7 @@
         <c:majorTickMark val="out"/>
         <c:minorTickMark val="none"/>
         <c:tickLblPos val="nextTo"/>
-        <c:crossAx val="90851584"/>
+        <c:crossAx val="33596544"/>
         <c:crosses val="autoZero"/>
         <c:auto val="1"/>
         <c:lblAlgn val="ctr"/>
@@ -671,7 +671,7 @@
         <c:noMultiLvlLbl val="0"/>
       </c:catAx>
       <c:valAx>
-        <c:axId val="90851584"/>
+        <c:axId val="33596544"/>
         <c:scaling>
           <c:orientation val="minMax"/>
         </c:scaling>
@@ -682,7 +682,7 @@
         <c:majorTickMark val="out"/>
         <c:minorTickMark val="none"/>
         <c:tickLblPos val="nextTo"/>
-        <c:crossAx val="52425728"/>
+        <c:crossAx val="130592256"/>
         <c:crosses val="autoZero"/>
         <c:crossBetween val="between"/>
       </c:valAx>
@@ -810,6 +810,7 @@
     </c:plotArea>
     <c:legend>
       <c:legendPos val="r"/>
+      <c:layout/>
       <c:overlay val="0"/>
     </c:legend>
     <c:plotVisOnly val="1"/>
@@ -982,11 +983,11 @@
         </c:dLbls>
         <c:marker val="1"/>
         <c:smooth val="0"/>
-        <c:axId val="51771904"/>
-        <c:axId val="90852736"/>
+        <c:axId val="142966784"/>
+        <c:axId val="33602304"/>
       </c:lineChart>
       <c:catAx>
-        <c:axId val="51771904"/>
+        <c:axId val="142966784"/>
         <c:scaling>
           <c:orientation val="minMax"/>
         </c:scaling>
@@ -995,7 +996,7 @@
         <c:majorTickMark val="out"/>
         <c:minorTickMark val="none"/>
         <c:tickLblPos val="nextTo"/>
-        <c:crossAx val="90852736"/>
+        <c:crossAx val="33602304"/>
         <c:crosses val="autoZero"/>
         <c:auto val="1"/>
         <c:lblAlgn val="ctr"/>
@@ -1003,7 +1004,7 @@
         <c:noMultiLvlLbl val="0"/>
       </c:catAx>
       <c:valAx>
-        <c:axId val="90852736"/>
+        <c:axId val="33602304"/>
         <c:scaling>
           <c:orientation val="minMax"/>
         </c:scaling>
@@ -1014,7 +1015,7 @@
         <c:majorTickMark val="out"/>
         <c:minorTickMark val="none"/>
         <c:tickLblPos val="nextTo"/>
-        <c:crossAx val="51771904"/>
+        <c:crossAx val="142966784"/>
         <c:crosses val="autoZero"/>
         <c:crossBetween val="between"/>
       </c:valAx>
@@ -1246,7 +1247,7 @@
           <a:p>
             <a:fld id="{B1AC4F1E-7C5C-4AF3-8078-9105627E20EC}" type="datetimeFigureOut">
               <a:rPr lang="ko-KR" altLang="en-US" smtClean="0"/>
-              <a:t>2019-05-07</a:t>
+              <a:t>2019-05-08</a:t>
             </a:fld>
             <a:endParaRPr lang="ko-KR" altLang="en-US"/>
           </a:p>
@@ -1900,7 +1901,7 @@
           <a:p>
             <a:fld id="{5461D8C1-8742-4899-8C54-88F14E68CB8A}" type="datetimeFigureOut">
               <a:rPr lang="ko-KR" altLang="en-US" smtClean="0"/>
-              <a:t>2019-05-07</a:t>
+              <a:t>2019-05-08</a:t>
             </a:fld>
             <a:endParaRPr lang="ko-KR" altLang="en-US"/>
           </a:p>
@@ -2213,7 +2214,7 @@
           <a:p>
             <a:fld id="{5461D8C1-8742-4899-8C54-88F14E68CB8A}" type="datetimeFigureOut">
               <a:rPr lang="ko-KR" altLang="en-US" smtClean="0"/>
-              <a:t>2019-05-07</a:t>
+              <a:t>2019-05-08</a:t>
             </a:fld>
             <a:endParaRPr lang="ko-KR" altLang="en-US"/>
           </a:p>
@@ -2398,7 +2399,7 @@
           <a:p>
             <a:fld id="{5461D8C1-8742-4899-8C54-88F14E68CB8A}" type="datetimeFigureOut">
               <a:rPr lang="ko-KR" altLang="en-US" smtClean="0"/>
-              <a:t>2019-05-07</a:t>
+              <a:t>2019-05-08</a:t>
             </a:fld>
             <a:endParaRPr lang="ko-KR" altLang="en-US"/>
           </a:p>
@@ -2573,7 +2574,7 @@
           <a:p>
             <a:fld id="{5461D8C1-8742-4899-8C54-88F14E68CB8A}" type="datetimeFigureOut">
               <a:rPr lang="ko-KR" altLang="en-US" smtClean="0"/>
-              <a:t>2019-05-07</a:t>
+              <a:t>2019-05-08</a:t>
             </a:fld>
             <a:endParaRPr lang="ko-KR" altLang="en-US"/>
           </a:p>
@@ -2841,7 +2842,7 @@
           <a:p>
             <a:fld id="{5461D8C1-8742-4899-8C54-88F14E68CB8A}" type="datetimeFigureOut">
               <a:rPr lang="ko-KR" altLang="en-US" smtClean="0"/>
-              <a:t>2019-05-07</a:t>
+              <a:t>2019-05-08</a:t>
             </a:fld>
             <a:endParaRPr lang="ko-KR" altLang="en-US"/>
           </a:p>
@@ -3309,7 +3310,7 @@
           <a:p>
             <a:fld id="{5461D8C1-8742-4899-8C54-88F14E68CB8A}" type="datetimeFigureOut">
               <a:rPr lang="ko-KR" altLang="en-US" smtClean="0"/>
-              <a:t>2019-05-07</a:t>
+              <a:t>2019-05-08</a:t>
             </a:fld>
             <a:endParaRPr lang="ko-KR" altLang="en-US"/>
           </a:p>
@@ -3798,7 +3799,7 @@
           <a:p>
             <a:fld id="{5461D8C1-8742-4899-8C54-88F14E68CB8A}" type="datetimeFigureOut">
               <a:rPr lang="ko-KR" altLang="en-US" smtClean="0"/>
-              <a:t>2019-05-07</a:t>
+              <a:t>2019-05-08</a:t>
             </a:fld>
             <a:endParaRPr lang="ko-KR" altLang="en-US"/>
           </a:p>
@@ -3924,7 +3925,7 @@
           <a:p>
             <a:fld id="{5461D8C1-8742-4899-8C54-88F14E68CB8A}" type="datetimeFigureOut">
               <a:rPr lang="ko-KR" altLang="en-US" smtClean="0"/>
-              <a:t>2019-05-07</a:t>
+              <a:t>2019-05-08</a:t>
             </a:fld>
             <a:endParaRPr lang="ko-KR" altLang="en-US"/>
           </a:p>
@@ -4068,7 +4069,7 @@
           <a:p>
             <a:fld id="{5461D8C1-8742-4899-8C54-88F14E68CB8A}" type="datetimeFigureOut">
               <a:rPr lang="ko-KR" altLang="en-US" smtClean="0"/>
-              <a:t>2019-05-07</a:t>
+              <a:t>2019-05-08</a:t>
             </a:fld>
             <a:endParaRPr lang="ko-KR" altLang="en-US"/>
           </a:p>
@@ -4390,7 +4391,7 @@
           <a:p>
             <a:fld id="{5461D8C1-8742-4899-8C54-88F14E68CB8A}" type="datetimeFigureOut">
               <a:rPr lang="ko-KR" altLang="en-US" smtClean="0"/>
-              <a:t>2019-05-07</a:t>
+              <a:t>2019-05-08</a:t>
             </a:fld>
             <a:endParaRPr lang="ko-KR" altLang="en-US"/>
           </a:p>
@@ -4524,7 +4525,7 @@
           <a:p>
             <a:fld id="{5461D8C1-8742-4899-8C54-88F14E68CB8A}" type="datetimeFigureOut">
               <a:rPr lang="ko-KR" altLang="en-US" smtClean="0"/>
-              <a:t>2019-05-07</a:t>
+              <a:t>2019-05-08</a:t>
             </a:fld>
             <a:endParaRPr lang="ko-KR" altLang="en-US"/>
           </a:p>
@@ -5305,7 +5306,7 @@
           <a:p>
             <a:fld id="{5461D8C1-8742-4899-8C54-88F14E68CB8A}" type="datetimeFigureOut">
               <a:rPr lang="ko-KR" altLang="en-US" smtClean="0"/>
-              <a:t>2019-05-07</a:t>
+              <a:t>2019-05-08</a:t>
             </a:fld>
             <a:endParaRPr lang="ko-KR" altLang="en-US"/>
           </a:p>
@@ -22342,7 +22343,7 @@
           <p:nvPr>
             <p:extLst>
               <p:ext uri="{D42A27DB-BD31-4B8C-83A1-F6EECF244321}">
-                <p14:modId xmlns:p14="http://schemas.microsoft.com/office/powerpoint/2010/main" val="1245454176"/>
+                <p14:modId xmlns:p14="http://schemas.microsoft.com/office/powerpoint/2010/main" val="2031403726"/>
               </p:ext>
             </p:extLst>
           </p:nvPr>
@@ -22925,20 +22926,20 @@
                         <a:defRPr/>
                       </a:pPr>
                       <a:r>
-                        <a:rPr lang="en-US" altLang="ko-KR" sz="1600" dirty="0" smtClean="0">
+                        <a:rPr lang="en-US" altLang="ko-KR" sz="1600" smtClean="0">
                           <a:solidFill>
                             <a:schemeClr val="tx1"/>
                           </a:solidFill>
                         </a:rPr>
-                        <a:t>(D)</a:t>
-                      </a:r>
-                      <a:r>
-                        <a:rPr lang="en-US" altLang="ko-KR" sz="1600" dirty="0" err="1" smtClean="0">
+                        <a:t>(</a:t>
+                      </a:r>
+                      <a:r>
+                        <a:rPr lang="en-US" altLang="ko-KR" sz="1600" smtClean="0">
                           <a:solidFill>
                             <a:schemeClr val="tx1"/>
                           </a:solidFill>
                         </a:rPr>
-                        <a:t>iDate</a:t>
+                        <a:t>DT)iDate</a:t>
                       </a:r>
                       <a:endParaRPr lang="en-US" altLang="ko-KR" sz="1600" dirty="0" smtClean="0">
                         <a:solidFill>

</xml_diff>